<commit_message>
Update powerpoint dan sedikit file jurnal.
</commit_message>
<xml_diff>
--- a/121402071.pptx
+++ b/121402071.pptx
@@ -208,7 +208,7 @@
           <a:p>
             <a:fld id="{F10A6F1E-F801-4F15-A7E1-5BC99120ACFB}" type="datetimeFigureOut">
               <a:rPr lang="en-US" smtClean="0"/>
-              <a:t>1/6/2017</a:t>
+              <a:t>1/12/2017</a:t>
             </a:fld>
             <a:endParaRPr lang="en-US"/>
           </a:p>
@@ -898,7 +898,7 @@
             <a:fld id="{87DE6118-2437-4B30-8E3C-4D2BE6020583}" type="datetimeFigureOut">
               <a:rPr lang="en-US" dirty="0"/>
               <a:pPr/>
-              <a:t>1/6/2017</a:t>
+              <a:t>1/12/2017</a:t>
             </a:fld>
             <a:endParaRPr lang="en-US" dirty="0"/>
           </a:p>
@@ -1224,7 +1224,7 @@
           <a:p>
             <a:fld id="{87DE6118-2437-4B30-8E3C-4D2BE6020583}" type="datetimeFigureOut">
               <a:rPr lang="en-US" dirty="0"/>
-              <a:t>1/6/2017</a:t>
+              <a:t>1/12/2017</a:t>
             </a:fld>
             <a:endParaRPr lang="en-US" dirty="0"/>
           </a:p>
@@ -1399,7 +1399,7 @@
           <a:p>
             <a:fld id="{87DE6118-2437-4B30-8E3C-4D2BE6020583}" type="datetimeFigureOut">
               <a:rPr lang="en-US" dirty="0"/>
-              <a:t>1/6/2017</a:t>
+              <a:t>1/12/2017</a:t>
             </a:fld>
             <a:endParaRPr lang="en-US" dirty="0"/>
           </a:p>
@@ -1564,7 +1564,7 @@
           <a:p>
             <a:fld id="{87DE6118-2437-4B30-8E3C-4D2BE6020583}" type="datetimeFigureOut">
               <a:rPr lang="en-US" dirty="0"/>
-              <a:t>1/6/2017</a:t>
+              <a:t>1/12/2017</a:t>
             </a:fld>
             <a:endParaRPr lang="en-US" dirty="0"/>
           </a:p>
@@ -1837,7 +1837,7 @@
             <a:fld id="{87DE6118-2437-4B30-8E3C-4D2BE6020583}" type="datetimeFigureOut">
               <a:rPr lang="en-US" dirty="0"/>
               <a:pPr/>
-              <a:t>1/6/2017</a:t>
+              <a:t>1/12/2017</a:t>
             </a:fld>
             <a:endParaRPr lang="en-US" dirty="0"/>
           </a:p>
@@ -2227,7 +2227,7 @@
           <a:p>
             <a:fld id="{87DE6118-2437-4B30-8E3C-4D2BE6020583}" type="datetimeFigureOut">
               <a:rPr lang="en-US" dirty="0"/>
-              <a:t>1/6/2017</a:t>
+              <a:t>1/12/2017</a:t>
             </a:fld>
             <a:endParaRPr lang="en-US" dirty="0"/>
           </a:p>
@@ -2699,7 +2699,7 @@
           <a:p>
             <a:fld id="{87DE6118-2437-4B30-8E3C-4D2BE6020583}" type="datetimeFigureOut">
               <a:rPr lang="en-US" dirty="0"/>
-              <a:t>1/6/2017</a:t>
+              <a:t>1/12/2017</a:t>
             </a:fld>
             <a:endParaRPr lang="en-US" dirty="0"/>
           </a:p>
@@ -2812,7 +2812,7 @@
           <a:p>
             <a:fld id="{87DE6118-2437-4B30-8E3C-4D2BE6020583}" type="datetimeFigureOut">
               <a:rPr lang="en-US" dirty="0"/>
-              <a:t>1/6/2017</a:t>
+              <a:t>1/12/2017</a:t>
             </a:fld>
             <a:endParaRPr lang="en-US" dirty="0"/>
           </a:p>
@@ -2902,7 +2902,7 @@
           <a:p>
             <a:fld id="{87DE6118-2437-4B30-8E3C-4D2BE6020583}" type="datetimeFigureOut">
               <a:rPr lang="en-US" dirty="0"/>
-              <a:t>1/6/2017</a:t>
+              <a:t>1/12/2017</a:t>
             </a:fld>
             <a:endParaRPr lang="en-US" dirty="0"/>
           </a:p>
@@ -3244,7 +3244,7 @@
             <a:fld id="{87DE6118-2437-4B30-8E3C-4D2BE6020583}" type="datetimeFigureOut">
               <a:rPr lang="en-US" dirty="0"/>
               <a:pPr/>
-              <a:t>1/6/2017</a:t>
+              <a:t>1/12/2017</a:t>
             </a:fld>
             <a:endParaRPr lang="en-US" dirty="0"/>
           </a:p>
@@ -3629,7 +3629,7 @@
             <a:fld id="{87DE6118-2437-4B30-8E3C-4D2BE6020583}" type="datetimeFigureOut">
               <a:rPr lang="en-US" dirty="0"/>
               <a:pPr/>
-              <a:t>1/6/2017</a:t>
+              <a:t>1/12/2017</a:t>
             </a:fld>
             <a:endParaRPr lang="en-US" dirty="0"/>
           </a:p>
@@ -3904,7 +3904,7 @@
             <a:fld id="{87DE6118-2437-4B30-8E3C-4D2BE6020583}" type="datetimeFigureOut">
               <a:rPr lang="en-US" dirty="0"/>
               <a:pPr/>
-              <a:t>1/6/2017</a:t>
+              <a:t>1/12/2017</a:t>
             </a:fld>
             <a:endParaRPr lang="en-US" dirty="0"/>
           </a:p>
@@ -4500,14 +4500,13 @@
           <a:p>
             <a:r>
               <a:rPr lang="en-US" sz="1800" dirty="0" smtClean="0"/>
-              <a:t>Eric Suwarno</a:t>
-            </a:r>
-          </a:p>
-          <a:p>
+              <a:t>Eric </a:t>
+            </a:r>
             <a:r>
               <a:rPr lang="en-US" sz="1800" dirty="0" smtClean="0"/>
-              <a:t>121402071</a:t>
-            </a:r>
+              <a:t>Suwarno (121402071)</a:t>
+            </a:r>
+            <a:endParaRPr lang="en-US" sz="1800" dirty="0" smtClean="0"/>
           </a:p>
           <a:p>
             <a:r>
@@ -4778,7 +4777,7 @@
           <a:graphicData uri="http://schemas.openxmlformats.org/presentationml/2006/ole">
             <mc:AlternateContent xmlns:mc="http://schemas.openxmlformats.org/markup-compatibility/2006">
               <mc:Choice xmlns:v="urn:schemas-microsoft-com:vml" Requires="v">
-                <p:oleObj spid="_x0000_s2062" name="Visio" r:id="rId3" imgW="9963004" imgH="5686517" progId="Visio.Drawing.15">
+                <p:oleObj spid="_x0000_s2071" name="Visio" r:id="rId3" imgW="9963004" imgH="5686517" progId="Visio.Drawing.15">
                   <p:embed/>
                 </p:oleObj>
               </mc:Choice>
@@ -4993,7 +4992,7 @@
           <a:graphicData uri="http://schemas.openxmlformats.org/presentationml/2006/ole">
             <mc:AlternateContent xmlns:mc="http://schemas.openxmlformats.org/markup-compatibility/2006">
               <mc:Choice xmlns:v="urn:schemas-microsoft-com:vml" Requires="v">
-                <p:oleObj spid="_x0000_s3086" name="Visio" r:id="rId3" imgW="7572574" imgH="10705985" progId="Visio.Drawing.15">
+                <p:oleObj spid="_x0000_s3095" name="Visio" r:id="rId3" imgW="7572574" imgH="10705985" progId="Visio.Drawing.15">
                   <p:embed/>
                 </p:oleObj>
               </mc:Choice>
@@ -5230,7 +5229,11 @@
           <a:p>
             <a:r>
               <a:rPr lang="id-ID" dirty="0" smtClean="0"/>
-              <a:t>Metodologi Penelitian</a:t>
+              <a:t>Metodologi </a:t>
+            </a:r>
+            <a:r>
+              <a:rPr lang="id-ID" dirty="0" smtClean="0"/>
+              <a:t>Penelitian</a:t>
             </a:r>
             <a:endParaRPr lang="en-US" dirty="0"/>
           </a:p>
@@ -5249,7 +5252,457 @@
   <p:timing>
     <p:tnLst>
       <p:par>
-        <p:cTn id="1" dur="indefinite" restart="never" nodeType="tmRoot"/>
+        <p:cTn id="1" dur="indefinite" restart="never" nodeType="tmRoot">
+          <p:childTnLst>
+            <p:seq concurrent="1" nextAc="seek">
+              <p:cTn id="2" dur="indefinite" nodeType="mainSeq">
+                <p:childTnLst>
+                  <p:par>
+                    <p:cTn id="3" fill="hold">
+                      <p:stCondLst>
+                        <p:cond delay="indefinite"/>
+                      </p:stCondLst>
+                      <p:childTnLst>
+                        <p:par>
+                          <p:cTn id="4" fill="hold">
+                            <p:stCondLst>
+                              <p:cond delay="0"/>
+                            </p:stCondLst>
+                            <p:childTnLst>
+                              <p:par>
+                                <p:cTn id="5" presetID="10" presetClass="entr" presetSubtype="0" fill="hold" nodeType="clickEffect">
+                                  <p:stCondLst>
+                                    <p:cond delay="0"/>
+                                  </p:stCondLst>
+                                  <p:childTnLst>
+                                    <p:set>
+                                      <p:cBhvr>
+                                        <p:cTn id="6" dur="1" fill="hold">
+                                          <p:stCondLst>
+                                            <p:cond delay="0"/>
+                                          </p:stCondLst>
+                                        </p:cTn>
+                                        <p:tgtEl>
+                                          <p:spTgt spid="3">
+                                            <p:txEl>
+                                              <p:pRg st="0" end="0"/>
+                                            </p:txEl>
+                                          </p:spTgt>
+                                        </p:tgtEl>
+                                        <p:attrNameLst>
+                                          <p:attrName>style.visibility</p:attrName>
+                                        </p:attrNameLst>
+                                      </p:cBhvr>
+                                      <p:to>
+                                        <p:strVal val="visible"/>
+                                      </p:to>
+                                    </p:set>
+                                    <p:animEffect transition="in" filter="fade">
+                                      <p:cBhvr>
+                                        <p:cTn id="7" dur="500"/>
+                                        <p:tgtEl>
+                                          <p:spTgt spid="3">
+                                            <p:txEl>
+                                              <p:pRg st="0" end="0"/>
+                                            </p:txEl>
+                                          </p:spTgt>
+                                        </p:tgtEl>
+                                      </p:cBhvr>
+                                    </p:animEffect>
+                                  </p:childTnLst>
+                                </p:cTn>
+                              </p:par>
+                            </p:childTnLst>
+                          </p:cTn>
+                        </p:par>
+                      </p:childTnLst>
+                    </p:cTn>
+                  </p:par>
+                  <p:par>
+                    <p:cTn id="8" fill="hold">
+                      <p:stCondLst>
+                        <p:cond delay="indefinite"/>
+                      </p:stCondLst>
+                      <p:childTnLst>
+                        <p:par>
+                          <p:cTn id="9" fill="hold">
+                            <p:stCondLst>
+                              <p:cond delay="0"/>
+                            </p:stCondLst>
+                            <p:childTnLst>
+                              <p:par>
+                                <p:cTn id="10" presetID="10" presetClass="entr" presetSubtype="0" fill="hold" nodeType="clickEffect">
+                                  <p:stCondLst>
+                                    <p:cond delay="0"/>
+                                  </p:stCondLst>
+                                  <p:childTnLst>
+                                    <p:set>
+                                      <p:cBhvr>
+                                        <p:cTn id="11" dur="1" fill="hold">
+                                          <p:stCondLst>
+                                            <p:cond delay="0"/>
+                                          </p:stCondLst>
+                                        </p:cTn>
+                                        <p:tgtEl>
+                                          <p:spTgt spid="3">
+                                            <p:txEl>
+                                              <p:pRg st="1" end="1"/>
+                                            </p:txEl>
+                                          </p:spTgt>
+                                        </p:tgtEl>
+                                        <p:attrNameLst>
+                                          <p:attrName>style.visibility</p:attrName>
+                                        </p:attrNameLst>
+                                      </p:cBhvr>
+                                      <p:to>
+                                        <p:strVal val="visible"/>
+                                      </p:to>
+                                    </p:set>
+                                    <p:animEffect transition="in" filter="fade">
+                                      <p:cBhvr>
+                                        <p:cTn id="12" dur="500"/>
+                                        <p:tgtEl>
+                                          <p:spTgt spid="3">
+                                            <p:txEl>
+                                              <p:pRg st="1" end="1"/>
+                                            </p:txEl>
+                                          </p:spTgt>
+                                        </p:tgtEl>
+                                      </p:cBhvr>
+                                    </p:animEffect>
+                                  </p:childTnLst>
+                                </p:cTn>
+                              </p:par>
+                            </p:childTnLst>
+                          </p:cTn>
+                        </p:par>
+                      </p:childTnLst>
+                    </p:cTn>
+                  </p:par>
+                  <p:par>
+                    <p:cTn id="13" fill="hold">
+                      <p:stCondLst>
+                        <p:cond delay="indefinite"/>
+                      </p:stCondLst>
+                      <p:childTnLst>
+                        <p:par>
+                          <p:cTn id="14" fill="hold">
+                            <p:stCondLst>
+                              <p:cond delay="0"/>
+                            </p:stCondLst>
+                            <p:childTnLst>
+                              <p:par>
+                                <p:cTn id="15" presetID="10" presetClass="entr" presetSubtype="0" fill="hold" nodeType="clickEffect">
+                                  <p:stCondLst>
+                                    <p:cond delay="0"/>
+                                  </p:stCondLst>
+                                  <p:childTnLst>
+                                    <p:set>
+                                      <p:cBhvr>
+                                        <p:cTn id="16" dur="1" fill="hold">
+                                          <p:stCondLst>
+                                            <p:cond delay="0"/>
+                                          </p:stCondLst>
+                                        </p:cTn>
+                                        <p:tgtEl>
+                                          <p:spTgt spid="3">
+                                            <p:txEl>
+                                              <p:pRg st="2" end="2"/>
+                                            </p:txEl>
+                                          </p:spTgt>
+                                        </p:tgtEl>
+                                        <p:attrNameLst>
+                                          <p:attrName>style.visibility</p:attrName>
+                                        </p:attrNameLst>
+                                      </p:cBhvr>
+                                      <p:to>
+                                        <p:strVal val="visible"/>
+                                      </p:to>
+                                    </p:set>
+                                    <p:animEffect transition="in" filter="fade">
+                                      <p:cBhvr>
+                                        <p:cTn id="17" dur="500"/>
+                                        <p:tgtEl>
+                                          <p:spTgt spid="3">
+                                            <p:txEl>
+                                              <p:pRg st="2" end="2"/>
+                                            </p:txEl>
+                                          </p:spTgt>
+                                        </p:tgtEl>
+                                      </p:cBhvr>
+                                    </p:animEffect>
+                                  </p:childTnLst>
+                                </p:cTn>
+                              </p:par>
+                            </p:childTnLst>
+                          </p:cTn>
+                        </p:par>
+                      </p:childTnLst>
+                    </p:cTn>
+                  </p:par>
+                  <p:par>
+                    <p:cTn id="18" fill="hold">
+                      <p:stCondLst>
+                        <p:cond delay="indefinite"/>
+                      </p:stCondLst>
+                      <p:childTnLst>
+                        <p:par>
+                          <p:cTn id="19" fill="hold">
+                            <p:stCondLst>
+                              <p:cond delay="0"/>
+                            </p:stCondLst>
+                            <p:childTnLst>
+                              <p:par>
+                                <p:cTn id="20" presetID="10" presetClass="entr" presetSubtype="0" fill="hold" nodeType="clickEffect">
+                                  <p:stCondLst>
+                                    <p:cond delay="0"/>
+                                  </p:stCondLst>
+                                  <p:childTnLst>
+                                    <p:set>
+                                      <p:cBhvr>
+                                        <p:cTn id="21" dur="1" fill="hold">
+                                          <p:stCondLst>
+                                            <p:cond delay="0"/>
+                                          </p:stCondLst>
+                                        </p:cTn>
+                                        <p:tgtEl>
+                                          <p:spTgt spid="3">
+                                            <p:txEl>
+                                              <p:pRg st="3" end="3"/>
+                                            </p:txEl>
+                                          </p:spTgt>
+                                        </p:tgtEl>
+                                        <p:attrNameLst>
+                                          <p:attrName>style.visibility</p:attrName>
+                                        </p:attrNameLst>
+                                      </p:cBhvr>
+                                      <p:to>
+                                        <p:strVal val="visible"/>
+                                      </p:to>
+                                    </p:set>
+                                    <p:animEffect transition="in" filter="fade">
+                                      <p:cBhvr>
+                                        <p:cTn id="22" dur="500"/>
+                                        <p:tgtEl>
+                                          <p:spTgt spid="3">
+                                            <p:txEl>
+                                              <p:pRg st="3" end="3"/>
+                                            </p:txEl>
+                                          </p:spTgt>
+                                        </p:tgtEl>
+                                      </p:cBhvr>
+                                    </p:animEffect>
+                                  </p:childTnLst>
+                                </p:cTn>
+                              </p:par>
+                            </p:childTnLst>
+                          </p:cTn>
+                        </p:par>
+                      </p:childTnLst>
+                    </p:cTn>
+                  </p:par>
+                  <p:par>
+                    <p:cTn id="23" fill="hold">
+                      <p:stCondLst>
+                        <p:cond delay="indefinite"/>
+                      </p:stCondLst>
+                      <p:childTnLst>
+                        <p:par>
+                          <p:cTn id="24" fill="hold">
+                            <p:stCondLst>
+                              <p:cond delay="0"/>
+                            </p:stCondLst>
+                            <p:childTnLst>
+                              <p:par>
+                                <p:cTn id="25" presetID="10" presetClass="entr" presetSubtype="0" fill="hold" nodeType="clickEffect">
+                                  <p:stCondLst>
+                                    <p:cond delay="0"/>
+                                  </p:stCondLst>
+                                  <p:childTnLst>
+                                    <p:set>
+                                      <p:cBhvr>
+                                        <p:cTn id="26" dur="1" fill="hold">
+                                          <p:stCondLst>
+                                            <p:cond delay="0"/>
+                                          </p:stCondLst>
+                                        </p:cTn>
+                                        <p:tgtEl>
+                                          <p:spTgt spid="3">
+                                            <p:txEl>
+                                              <p:pRg st="4" end="4"/>
+                                            </p:txEl>
+                                          </p:spTgt>
+                                        </p:tgtEl>
+                                        <p:attrNameLst>
+                                          <p:attrName>style.visibility</p:attrName>
+                                        </p:attrNameLst>
+                                      </p:cBhvr>
+                                      <p:to>
+                                        <p:strVal val="visible"/>
+                                      </p:to>
+                                    </p:set>
+                                    <p:animEffect transition="in" filter="fade">
+                                      <p:cBhvr>
+                                        <p:cTn id="27" dur="500"/>
+                                        <p:tgtEl>
+                                          <p:spTgt spid="3">
+                                            <p:txEl>
+                                              <p:pRg st="4" end="4"/>
+                                            </p:txEl>
+                                          </p:spTgt>
+                                        </p:tgtEl>
+                                      </p:cBhvr>
+                                    </p:animEffect>
+                                  </p:childTnLst>
+                                </p:cTn>
+                              </p:par>
+                            </p:childTnLst>
+                          </p:cTn>
+                        </p:par>
+                      </p:childTnLst>
+                    </p:cTn>
+                  </p:par>
+                  <p:par>
+                    <p:cTn id="28" fill="hold">
+                      <p:stCondLst>
+                        <p:cond delay="indefinite"/>
+                      </p:stCondLst>
+                      <p:childTnLst>
+                        <p:par>
+                          <p:cTn id="29" fill="hold">
+                            <p:stCondLst>
+                              <p:cond delay="0"/>
+                            </p:stCondLst>
+                            <p:childTnLst>
+                              <p:par>
+                                <p:cTn id="30" presetID="10" presetClass="entr" presetSubtype="0" fill="hold" nodeType="clickEffect">
+                                  <p:stCondLst>
+                                    <p:cond delay="0"/>
+                                  </p:stCondLst>
+                                  <p:childTnLst>
+                                    <p:set>
+                                      <p:cBhvr>
+                                        <p:cTn id="31" dur="1" fill="hold">
+                                          <p:stCondLst>
+                                            <p:cond delay="0"/>
+                                          </p:stCondLst>
+                                        </p:cTn>
+                                        <p:tgtEl>
+                                          <p:spTgt spid="3">
+                                            <p:txEl>
+                                              <p:pRg st="5" end="5"/>
+                                            </p:txEl>
+                                          </p:spTgt>
+                                        </p:tgtEl>
+                                        <p:attrNameLst>
+                                          <p:attrName>style.visibility</p:attrName>
+                                        </p:attrNameLst>
+                                      </p:cBhvr>
+                                      <p:to>
+                                        <p:strVal val="visible"/>
+                                      </p:to>
+                                    </p:set>
+                                    <p:animEffect transition="in" filter="fade">
+                                      <p:cBhvr>
+                                        <p:cTn id="32" dur="500"/>
+                                        <p:tgtEl>
+                                          <p:spTgt spid="3">
+                                            <p:txEl>
+                                              <p:pRg st="5" end="5"/>
+                                            </p:txEl>
+                                          </p:spTgt>
+                                        </p:tgtEl>
+                                      </p:cBhvr>
+                                    </p:animEffect>
+                                  </p:childTnLst>
+                                </p:cTn>
+                              </p:par>
+                            </p:childTnLst>
+                          </p:cTn>
+                        </p:par>
+                      </p:childTnLst>
+                    </p:cTn>
+                  </p:par>
+                  <p:par>
+                    <p:cTn id="33" fill="hold">
+                      <p:stCondLst>
+                        <p:cond delay="indefinite"/>
+                      </p:stCondLst>
+                      <p:childTnLst>
+                        <p:par>
+                          <p:cTn id="34" fill="hold">
+                            <p:stCondLst>
+                              <p:cond delay="0"/>
+                            </p:stCondLst>
+                            <p:childTnLst>
+                              <p:par>
+                                <p:cTn id="35" presetID="10" presetClass="entr" presetSubtype="0" fill="hold" nodeType="clickEffect">
+                                  <p:stCondLst>
+                                    <p:cond delay="0"/>
+                                  </p:stCondLst>
+                                  <p:childTnLst>
+                                    <p:set>
+                                      <p:cBhvr>
+                                        <p:cTn id="36" dur="1" fill="hold">
+                                          <p:stCondLst>
+                                            <p:cond delay="0"/>
+                                          </p:stCondLst>
+                                        </p:cTn>
+                                        <p:tgtEl>
+                                          <p:spTgt spid="3">
+                                            <p:txEl>
+                                              <p:pRg st="6" end="6"/>
+                                            </p:txEl>
+                                          </p:spTgt>
+                                        </p:tgtEl>
+                                        <p:attrNameLst>
+                                          <p:attrName>style.visibility</p:attrName>
+                                        </p:attrNameLst>
+                                      </p:cBhvr>
+                                      <p:to>
+                                        <p:strVal val="visible"/>
+                                      </p:to>
+                                    </p:set>
+                                    <p:animEffect transition="in" filter="fade">
+                                      <p:cBhvr>
+                                        <p:cTn id="37" dur="500"/>
+                                        <p:tgtEl>
+                                          <p:spTgt spid="3">
+                                            <p:txEl>
+                                              <p:pRg st="6" end="6"/>
+                                            </p:txEl>
+                                          </p:spTgt>
+                                        </p:tgtEl>
+                                      </p:cBhvr>
+                                    </p:animEffect>
+                                  </p:childTnLst>
+                                </p:cTn>
+                              </p:par>
+                            </p:childTnLst>
+                          </p:cTn>
+                        </p:par>
+                      </p:childTnLst>
+                    </p:cTn>
+                  </p:par>
+                </p:childTnLst>
+              </p:cTn>
+              <p:prevCondLst>
+                <p:cond evt="onPrev" delay="0">
+                  <p:tgtEl>
+                    <p:sldTgt/>
+                  </p:tgtEl>
+                </p:cond>
+              </p:prevCondLst>
+              <p:nextCondLst>
+                <p:cond evt="onNext" delay="0">
+                  <p:tgtEl>
+                    <p:sldTgt/>
+                  </p:tgtEl>
+                </p:cond>
+              </p:nextCondLst>
+            </p:seq>
+          </p:childTnLst>
+        </p:cTn>
       </p:par>
     </p:tnLst>
   </p:timing>
@@ -5343,11 +5796,7 @@
             </a:pPr>
             <a:r>
               <a:rPr lang="id-ID" sz="2400" dirty="0" smtClean="0"/>
-              <a:t>Pengukuran kualitas air dilakukan secara </a:t>
-            </a:r>
-            <a:r>
-              <a:rPr lang="id-ID" sz="2400" dirty="0" smtClean="0"/>
-              <a:t>konvensional</a:t>
+              <a:t>Pengukuran kualitas air dilakukan secara konvensional</a:t>
             </a:r>
             <a:endParaRPr lang="en-US" sz="2400" dirty="0" smtClean="0"/>
           </a:p>
@@ -5372,7 +5821,6 @@
               <a:rPr lang="id-ID" sz="2400" dirty="0" smtClean="0"/>
               <a:t>Kebutuhan akan proses klasifikasi kualitas air dengan waktu komputasi dan akurasi yang baik</a:t>
             </a:r>
-            <a:endParaRPr lang="id-ID" sz="2400" dirty="0" smtClean="0"/>
           </a:p>
         </p:txBody>
       </p:sp>
@@ -6580,7 +7028,7 @@
         </p:nvGraphicFramePr>
         <p:xfrm>
           <a:off x="1371600" y="1428750"/>
-          <a:ext cx="10361053" cy="5018349"/>
+          <a:ext cx="10361053" cy="5232660"/>
         </p:xfrm>
         <a:graphic>
           <a:graphicData uri="http://schemas.openxmlformats.org/drawingml/2006/table">

</xml_diff>